<commit_message>
Improvement for project idea apresentation
</commit_message>
<xml_diff>
--- a/studios/studio1/Project Idea Presentation.pptx
+++ b/studios/studio1/Project Idea Presentation.pptx
@@ -114,6 +114,11 @@
       </a:defRPr>
     </a:lvl9pPr>
   </p:defaultTextStyle>
+  <p:extLst>
+    <p:ext uri="{EFAFB233-063F-42B5-8137-9DF3F51BA10A}">
+      <p15:sldGuideLst xmlns:p15="http://schemas.microsoft.com/office/powerpoint/2012/main"/>
+    </p:ext>
+  </p:extLst>
 </p:presentation>
 </file>
 
@@ -212,7 +217,7 @@
           <a:effectLst/>
           <a:extLst>
             <a:ext uri="{91240B29-F687-4f45-9708-019B960494DF}">
-              <a14:hiddenLine xmlns:a14="http://schemas.microsoft.com/office/drawing/2010/main" xmlns="" w="9525">
+              <a14:hiddenLine xmlns="" xmlns:a14="http://schemas.microsoft.com/office/drawing/2010/main" w="9525">
                 <a:solidFill>
                   <a:srgbClr val="000000"/>
                 </a:solidFill>
@@ -404,7 +409,7 @@
           <a:p>
             <a:fld id="{54A155FC-439E-40E0-95BC-8BA95B6ED36E}" type="datetimeFigureOut">
               <a:rPr lang="en-US" smtClean="0"/>
-              <a:t>10/01/20</a:t>
+              <a:t>10/1/2020</a:t>
             </a:fld>
             <a:endParaRPr lang="en-US"/>
           </a:p>
@@ -446,7 +451,7 @@
           <a:p>
             <a:fld id="{3EC53682-3E32-427A-9A4A-30D9C6926AA7}" type="slidenum">
               <a:rPr lang="en-US" smtClean="0"/>
-              <a:t>‹#›</a:t>
+              <a:t>‹nº›</a:t>
             </a:fld>
             <a:endParaRPr lang="en-US"/>
           </a:p>
@@ -722,7 +727,7 @@
           <a:p>
             <a:fld id="{54A155FC-439E-40E0-95BC-8BA95B6ED36E}" type="datetimeFigureOut">
               <a:rPr lang="en-US" smtClean="0"/>
-              <a:t>10/01/20</a:t>
+              <a:t>10/1/2020</a:t>
             </a:fld>
             <a:endParaRPr lang="en-US"/>
           </a:p>
@@ -764,7 +769,7 @@
           <a:p>
             <a:fld id="{3EC53682-3E32-427A-9A4A-30D9C6926AA7}" type="slidenum">
               <a:rPr lang="en-US" smtClean="0"/>
-              <a:t>‹#›</a:t>
+              <a:t>‹nº›</a:t>
             </a:fld>
             <a:endParaRPr lang="en-US"/>
           </a:p>
@@ -1210,7 +1215,7 @@
           <a:p>
             <a:fld id="{54A155FC-439E-40E0-95BC-8BA95B6ED36E}" type="datetimeFigureOut">
               <a:rPr lang="en-US" smtClean="0"/>
-              <a:t>10/01/20</a:t>
+              <a:t>10/1/2020</a:t>
             </a:fld>
             <a:endParaRPr lang="en-US"/>
           </a:p>
@@ -1252,7 +1257,7 @@
           <a:p>
             <a:fld id="{3EC53682-3E32-427A-9A4A-30D9C6926AA7}" type="slidenum">
               <a:rPr lang="en-US" smtClean="0"/>
-              <a:t>‹#›</a:t>
+              <a:t>‹nº›</a:t>
             </a:fld>
             <a:endParaRPr lang="en-US"/>
           </a:p>
@@ -1579,7 +1584,7 @@
           <a:p>
             <a:fld id="{54A155FC-439E-40E0-95BC-8BA95B6ED36E}" type="datetimeFigureOut">
               <a:rPr lang="en-US" smtClean="0"/>
-              <a:t>10/01/20</a:t>
+              <a:t>10/1/2020</a:t>
             </a:fld>
             <a:endParaRPr lang="en-US"/>
           </a:p>
@@ -1621,7 +1626,7 @@
           <a:p>
             <a:fld id="{3EC53682-3E32-427A-9A4A-30D9C6926AA7}" type="slidenum">
               <a:rPr lang="en-US" smtClean="0"/>
-              <a:t>‹#›</a:t>
+              <a:t>‹nº›</a:t>
             </a:fld>
             <a:endParaRPr lang="en-US"/>
           </a:p>
@@ -1734,7 +1739,7 @@
           <a:ln/>
           <a:extLst>
             <a:ext uri="{91240B29-F687-4f45-9708-019B960494DF}">
-              <a14:hiddenLine xmlns:a14="http://schemas.microsoft.com/office/drawing/2010/main" xmlns="" w="9525">
+              <a14:hiddenLine xmlns="" xmlns:a14="http://schemas.microsoft.com/office/drawing/2010/main" w="9525">
                 <a:solidFill>
                   <a:srgbClr val="000000"/>
                 </a:solidFill>
@@ -1852,7 +1857,7 @@
           <a:p>
             <a:fld id="{54A155FC-439E-40E0-95BC-8BA95B6ED36E}" type="datetimeFigureOut">
               <a:rPr lang="en-US" smtClean="0"/>
-              <a:t>10/01/20</a:t>
+              <a:t>10/1/2020</a:t>
             </a:fld>
             <a:endParaRPr lang="en-US"/>
           </a:p>
@@ -1894,7 +1899,7 @@
           <a:p>
             <a:fld id="{3EC53682-3E32-427A-9A4A-30D9C6926AA7}" type="slidenum">
               <a:rPr lang="en-US" smtClean="0"/>
-              <a:t>‹#›</a:t>
+              <a:t>‹nº›</a:t>
             </a:fld>
             <a:endParaRPr lang="en-US"/>
           </a:p>
@@ -2009,7 +2014,7 @@
           <a:ln/>
           <a:extLst>
             <a:ext uri="{91240B29-F687-4f45-9708-019B960494DF}">
-              <a14:hiddenLine xmlns:a14="http://schemas.microsoft.com/office/drawing/2010/main" xmlns="" w="9525">
+              <a14:hiddenLine xmlns="" xmlns:a14="http://schemas.microsoft.com/office/drawing/2010/main" w="9525">
                 <a:solidFill>
                   <a:srgbClr val="000000"/>
                 </a:solidFill>
@@ -2137,7 +2142,7 @@
           <a:p>
             <a:fld id="{54A155FC-439E-40E0-95BC-8BA95B6ED36E}" type="datetimeFigureOut">
               <a:rPr lang="en-US" smtClean="0"/>
-              <a:t>10/01/20</a:t>
+              <a:t>10/1/2020</a:t>
             </a:fld>
             <a:endParaRPr lang="en-US"/>
           </a:p>
@@ -2179,7 +2184,7 @@
           <a:p>
             <a:fld id="{3EC53682-3E32-427A-9A4A-30D9C6926AA7}" type="slidenum">
               <a:rPr lang="en-US" smtClean="0"/>
-              <a:t>‹#›</a:t>
+              <a:t>‹nº›</a:t>
             </a:fld>
             <a:endParaRPr lang="en-US"/>
           </a:p>
@@ -2292,7 +2297,7 @@
           <a:ln/>
           <a:extLst>
             <a:ext uri="{91240B29-F687-4f45-9708-019B960494DF}">
-              <a14:hiddenLine xmlns:a14="http://schemas.microsoft.com/office/drawing/2010/main" xmlns="" w="9525">
+              <a14:hiddenLine xmlns="" xmlns:a14="http://schemas.microsoft.com/office/drawing/2010/main" w="9525">
                 <a:solidFill>
                   <a:srgbClr val="000000"/>
                 </a:solidFill>
@@ -2420,7 +2425,7 @@
           <a:p>
             <a:fld id="{54A155FC-439E-40E0-95BC-8BA95B6ED36E}" type="datetimeFigureOut">
               <a:rPr lang="en-US" smtClean="0"/>
-              <a:t>10/01/20</a:t>
+              <a:t>10/1/2020</a:t>
             </a:fld>
             <a:endParaRPr lang="en-US"/>
           </a:p>
@@ -2462,7 +2467,7 @@
           <a:p>
             <a:fld id="{3EC53682-3E32-427A-9A4A-30D9C6926AA7}" type="slidenum">
               <a:rPr lang="en-US" smtClean="0"/>
-              <a:t>‹#›</a:t>
+              <a:t>‹nº›</a:t>
             </a:fld>
             <a:endParaRPr lang="en-US"/>
           </a:p>
@@ -2763,7 +2768,7 @@
           <a:p>
             <a:fld id="{54A155FC-439E-40E0-95BC-8BA95B6ED36E}" type="datetimeFigureOut">
               <a:rPr lang="en-US" smtClean="0"/>
-              <a:t>10/01/20</a:t>
+              <a:t>10/1/2020</a:t>
             </a:fld>
             <a:endParaRPr lang="en-US"/>
           </a:p>
@@ -2805,7 +2810,7 @@
           <a:p>
             <a:fld id="{3EC53682-3E32-427A-9A4A-30D9C6926AA7}" type="slidenum">
               <a:rPr lang="en-US" smtClean="0"/>
-              <a:t>‹#›</a:t>
+              <a:t>‹nº›</a:t>
             </a:fld>
             <a:endParaRPr lang="en-US"/>
           </a:p>
@@ -2918,7 +2923,7 @@
           <a:ln/>
           <a:extLst>
             <a:ext uri="{91240B29-F687-4f45-9708-019B960494DF}">
-              <a14:hiddenLine xmlns:a14="http://schemas.microsoft.com/office/drawing/2010/main" xmlns="" w="9525">
+              <a14:hiddenLine xmlns="" xmlns:a14="http://schemas.microsoft.com/office/drawing/2010/main" w="9525">
                 <a:solidFill>
                   <a:srgbClr val="000000"/>
                 </a:solidFill>
@@ -3102,7 +3107,7 @@
           <a:p>
             <a:fld id="{54A155FC-439E-40E0-95BC-8BA95B6ED36E}" type="datetimeFigureOut">
               <a:rPr lang="en-US" smtClean="0"/>
-              <a:t>10/01/20</a:t>
+              <a:t>10/1/2020</a:t>
             </a:fld>
             <a:endParaRPr lang="en-US"/>
           </a:p>
@@ -3144,7 +3149,7 @@
           <a:p>
             <a:fld id="{3EC53682-3E32-427A-9A4A-30D9C6926AA7}" type="slidenum">
               <a:rPr lang="en-US" smtClean="0"/>
-              <a:t>‹#›</a:t>
+              <a:t>‹nº›</a:t>
             </a:fld>
             <a:endParaRPr lang="en-US"/>
           </a:p>
@@ -3257,7 +3262,7 @@
           <a:ln/>
           <a:extLst>
             <a:ext uri="{91240B29-F687-4f45-9708-019B960494DF}">
-              <a14:hiddenLine xmlns:a14="http://schemas.microsoft.com/office/drawing/2010/main" xmlns="" w="9525">
+              <a14:hiddenLine xmlns="" xmlns:a14="http://schemas.microsoft.com/office/drawing/2010/main" w="9525">
                 <a:solidFill>
                   <a:srgbClr val="000000"/>
                 </a:solidFill>
@@ -3579,7 +3584,7 @@
           <a:p>
             <a:fld id="{54A155FC-439E-40E0-95BC-8BA95B6ED36E}" type="datetimeFigureOut">
               <a:rPr lang="en-US" smtClean="0"/>
-              <a:t>10/01/20</a:t>
+              <a:t>10/1/2020</a:t>
             </a:fld>
             <a:endParaRPr lang="en-US"/>
           </a:p>
@@ -3621,7 +3626,7 @@
           <a:p>
             <a:fld id="{3EC53682-3E32-427A-9A4A-30D9C6926AA7}" type="slidenum">
               <a:rPr lang="en-US" smtClean="0"/>
-              <a:t>‹#›</a:t>
+              <a:t>‹nº›</a:t>
             </a:fld>
             <a:endParaRPr lang="en-US"/>
           </a:p>
@@ -3734,7 +3739,7 @@
           <a:ln/>
           <a:extLst>
             <a:ext uri="{91240B29-F687-4f45-9708-019B960494DF}">
-              <a14:hiddenLine xmlns:a14="http://schemas.microsoft.com/office/drawing/2010/main" xmlns="" w="9525">
+              <a14:hiddenLine xmlns="" xmlns:a14="http://schemas.microsoft.com/office/drawing/2010/main" w="9525">
                 <a:solidFill>
                   <a:srgbClr val="000000"/>
                 </a:solidFill>
@@ -3800,7 +3805,7 @@
           <a:p>
             <a:fld id="{54A155FC-439E-40E0-95BC-8BA95B6ED36E}" type="datetimeFigureOut">
               <a:rPr lang="en-US" smtClean="0"/>
-              <a:t>10/01/20</a:t>
+              <a:t>10/1/2020</a:t>
             </a:fld>
             <a:endParaRPr lang="en-US"/>
           </a:p>
@@ -3842,7 +3847,7 @@
           <a:p>
             <a:fld id="{3EC53682-3E32-427A-9A4A-30D9C6926AA7}" type="slidenum">
               <a:rPr lang="en-US" smtClean="0"/>
-              <a:t>‹#›</a:t>
+              <a:t>‹nº›</a:t>
             </a:fld>
             <a:endParaRPr lang="en-US"/>
           </a:p>
@@ -3895,7 +3900,7 @@
           <a:p>
             <a:fld id="{54A155FC-439E-40E0-95BC-8BA95B6ED36E}" type="datetimeFigureOut">
               <a:rPr lang="en-US" smtClean="0"/>
-              <a:t>10/01/20</a:t>
+              <a:t>10/1/2020</a:t>
             </a:fld>
             <a:endParaRPr lang="en-US"/>
           </a:p>
@@ -3937,7 +3942,7 @@
           <a:p>
             <a:fld id="{3EC53682-3E32-427A-9A4A-30D9C6926AA7}" type="slidenum">
               <a:rPr lang="en-US" smtClean="0"/>
-              <a:t>‹#›</a:t>
+              <a:t>‹nº›</a:t>
             </a:fld>
             <a:endParaRPr lang="en-US"/>
           </a:p>
@@ -4163,7 +4168,7 @@
           <a:ln/>
           <a:extLst>
             <a:ext uri="{91240B29-F687-4f45-9708-019B960494DF}">
-              <a14:hiddenLine xmlns:a14="http://schemas.microsoft.com/office/drawing/2010/main" xmlns="" w="9525">
+              <a14:hiddenLine xmlns="" xmlns:a14="http://schemas.microsoft.com/office/drawing/2010/main" w="9525">
                 <a:solidFill>
                   <a:srgbClr val="000000"/>
                 </a:solidFill>
@@ -4362,7 +4367,7 @@
           <a:p>
             <a:fld id="{54A155FC-439E-40E0-95BC-8BA95B6ED36E}" type="datetimeFigureOut">
               <a:rPr lang="en-US" smtClean="0"/>
-              <a:t>10/01/20</a:t>
+              <a:t>10/1/2020</a:t>
             </a:fld>
             <a:endParaRPr lang="en-US"/>
           </a:p>
@@ -4404,7 +4409,7 @@
           <a:p>
             <a:fld id="{3EC53682-3E32-427A-9A4A-30D9C6926AA7}" type="slidenum">
               <a:rPr lang="en-US" smtClean="0"/>
-              <a:t>‹#›</a:t>
+              <a:t>‹nº›</a:t>
             </a:fld>
             <a:endParaRPr lang="en-US"/>
           </a:p>
@@ -4675,7 +4680,7 @@
           <a:p>
             <a:fld id="{54A155FC-439E-40E0-95BC-8BA95B6ED36E}" type="datetimeFigureOut">
               <a:rPr lang="en-US" smtClean="0"/>
-              <a:t>10/01/20</a:t>
+              <a:t>10/1/2020</a:t>
             </a:fld>
             <a:endParaRPr lang="en-US"/>
           </a:p>
@@ -4727,7 +4732,7 @@
           <a:p>
             <a:fld id="{3EC53682-3E32-427A-9A4A-30D9C6926AA7}" type="slidenum">
               <a:rPr lang="en-US" smtClean="0"/>
-              <a:t>‹#›</a:t>
+              <a:t>‹nº›</a:t>
             </a:fld>
             <a:endParaRPr lang="en-US"/>
           </a:p>
@@ -4945,7 +4950,7 @@
           <a:p>
             <a:fld id="{54A155FC-439E-40E0-95BC-8BA95B6ED36E}" type="datetimeFigureOut">
               <a:rPr lang="en-US" smtClean="0"/>
-              <a:t>10/01/20</a:t>
+              <a:t>10/1/2020</a:t>
             </a:fld>
             <a:endParaRPr lang="en-US"/>
           </a:p>
@@ -4984,7 +4989,7 @@
           <a:p>
             <a:fld id="{3EC53682-3E32-427A-9A4A-30D9C6926AA7}" type="slidenum">
               <a:rPr lang="en-US" smtClean="0"/>
-              <a:t>‹#›</a:t>
+              <a:t>‹nº›</a:t>
             </a:fld>
             <a:endParaRPr lang="en-US"/>
           </a:p>
@@ -5625,7 +5630,12 @@
             <p:ph type="title"/>
           </p:nvPr>
         </p:nvSpPr>
-        <p:spPr/>
+        <p:spPr>
+          <a:xfrm>
+            <a:off x="1338039" y="2425105"/>
+            <a:ext cx="4382521" cy="2007789"/>
+          </a:xfrm>
+        </p:spPr>
         <p:txBody>
           <a:bodyPr/>
           <a:lstStyle/>
@@ -5637,103 +5647,6 @@
             <a:r>
               <a:rPr lang="pt-PT" dirty="0"/>
               <a:t>?</a:t>
-            </a:r>
-            <a:endParaRPr lang="en-US" dirty="0"/>
-          </a:p>
-        </p:txBody>
-      </p:sp>
-      <p:sp>
-        <p:nvSpPr>
-          <p:cNvPr id="3" name="Text Placeholder 2">
-            <a:extLst>
-              <a:ext uri="{FF2B5EF4-FFF2-40B4-BE49-F238E27FC236}">
-                <a16:creationId xmlns:a16="http://schemas.microsoft.com/office/drawing/2014/main" id="{CEE99763-1523-4430-86D6-2AB9704F2E7C}"/>
-              </a:ext>
-            </a:extLst>
-          </p:cNvPr>
-          <p:cNvSpPr>
-            <a:spLocks noGrp="1"/>
-          </p:cNvSpPr>
-          <p:nvPr>
-            <p:ph type="body" sz="quarter" idx="16"/>
-          </p:nvPr>
-        </p:nvSpPr>
-        <p:spPr/>
-        <p:txBody>
-          <a:bodyPr>
-            <a:normAutofit lnSpcReduction="10000"/>
-          </a:bodyPr>
-          <a:lstStyle/>
-          <a:p>
-            <a:r>
-              <a:rPr lang="pt-BR" b="0" i="0" dirty="0">
-                <a:solidFill>
-                  <a:srgbClr val="DCDDDE"/>
-                </a:solidFill>
-                <a:effectLst/>
-                <a:latin typeface="Whitney"/>
-              </a:rPr>
-              <a:t>424759 - Filipe Amaral</a:t>
-            </a:r>
-          </a:p>
-          <a:p>
-            <a:r>
-              <a:rPr lang="pt-BR" b="0" i="0" dirty="0">
-                <a:solidFill>
-                  <a:srgbClr val="DCDDDE"/>
-                </a:solidFill>
-                <a:effectLst/>
-                <a:latin typeface="Whitney"/>
-              </a:rPr>
-              <a:t>189444 - Francisco Cecílio</a:t>
-            </a:r>
-          </a:p>
-          <a:p>
-            <a:r>
-              <a:rPr lang="pt-BR" b="0" i="0" dirty="0">
-                <a:solidFill>
-                  <a:srgbClr val="DCDDDE"/>
-                </a:solidFill>
-                <a:effectLst/>
-                <a:latin typeface="Whitney"/>
-              </a:rPr>
-              <a:t>180888 - Francisco Mira</a:t>
-            </a:r>
-          </a:p>
-          <a:p>
-            <a:r>
-              <a:rPr lang="pt-BR" b="0" i="0" dirty="0">
-                <a:solidFill>
-                  <a:srgbClr val="DCDDDE"/>
-                </a:solidFill>
-                <a:effectLst/>
-                <a:latin typeface="Whitney"/>
-              </a:rPr>
-              <a:t>189466 - Isabel Soares</a:t>
-            </a:r>
-          </a:p>
-          <a:p>
-            <a:r>
-              <a:rPr lang="pt-BR" b="0" i="0" dirty="0">
-                <a:solidFill>
-                  <a:srgbClr val="DCDDDE"/>
-                </a:solidFill>
-                <a:effectLst/>
-                <a:latin typeface="Whitney"/>
-              </a:rPr>
-              <a:t>189492 - Lídia Custódio</a:t>
-            </a:r>
-          </a:p>
-          <a:p>
-            <a:r>
-              <a:rPr lang="pt-BR" b="0" i="0" dirty="0">
-                <a:solidFill>
-                  <a:srgbClr val="DCDDDE"/>
-                </a:solidFill>
-                <a:effectLst/>
-                <a:latin typeface="Whitney"/>
-              </a:rPr>
-              <a:t>179751 - Ricardo Machado</a:t>
             </a:r>
             <a:endParaRPr lang="en-US" dirty="0"/>
           </a:p>
@@ -5815,7 +5728,7 @@
         <p:spPr>
           <a:xfrm>
             <a:off x="818710" y="2951334"/>
-            <a:ext cx="7101971" cy="3066407"/>
+            <a:ext cx="8353865" cy="3066407"/>
           </a:xfrm>
           <a:prstGeom prst="rect">
             <a:avLst/>
@@ -6114,8 +6027,18 @@
             </a:r>
             <a:r>
               <a:rPr lang="pt-PT" sz="2400" dirty="0"/>
-              <a:t>rancisco Mira</a:t>
-            </a:r>
+              <a:t>rancisco Mira (</a:t>
+            </a:r>
+            <a:r>
+              <a:rPr lang="pt-BR" sz="2400" b="0" i="0" dirty="0">
+                <a:solidFill>
+                  <a:srgbClr val="DCDDDE"/>
+                </a:solidFill>
+                <a:effectLst/>
+              </a:rPr>
+              <a:t>180888)</a:t>
+            </a:r>
+            <a:endParaRPr lang="pt-PT" sz="2400" dirty="0"/>
           </a:p>
           <a:p>
             <a:pPr marL="0" indent="0">
@@ -6123,7 +6046,7 @@
             </a:pPr>
             <a:r>
               <a:rPr lang="pt-PT" sz="2400" dirty="0"/>
-              <a:t>Francisco Cecílio</a:t>
+              <a:t>Francisco Cecílio (189444)</a:t>
             </a:r>
           </a:p>
           <a:p>
@@ -6132,7 +6055,7 @@
             </a:pPr>
             <a:r>
               <a:rPr lang="pt-PT" sz="2400" dirty="0"/>
-              <a:t>Isabel Soares</a:t>
+              <a:t>Isabel Soares (189466)</a:t>
             </a:r>
           </a:p>
           <a:p>
@@ -6141,7 +6064,7 @@
             </a:pPr>
             <a:r>
               <a:rPr lang="pt-PT" sz="2400" dirty="0"/>
-              <a:t>Lídia Custódio</a:t>
+              <a:t>Lídia Custódio (189492)</a:t>
             </a:r>
           </a:p>
           <a:p>
@@ -6150,7 +6073,7 @@
             </a:pPr>
             <a:r>
               <a:rPr lang="pt-PT" sz="2400" dirty="0"/>
-              <a:t>Ricardo Machado</a:t>
+              <a:t>Ricardo Machado (179751)</a:t>
             </a:r>
           </a:p>
           <a:p>
@@ -6159,7 +6082,7 @@
             </a:pPr>
             <a:r>
               <a:rPr lang="pt-PT" sz="2400" dirty="0"/>
-              <a:t>Filipe Amaral</a:t>
+              <a:t>Filipe Amaral (424759)</a:t>
             </a:r>
             <a:endParaRPr lang="pt-PT" sz="2400" b="1" dirty="0"/>
           </a:p>

</xml_diff>